<commit_message>
corrected location of Prague
</commit_message>
<xml_diff>
--- a/raster.pptx
+++ b/raster.pptx
@@ -104,6 +104,11 @@
       </a:defRPr>
     </a:lvl9pPr>
   </p:defaultTextStyle>
+  <p:extLst>
+    <p:ext uri="{EFAFB233-063F-42B5-8137-9DF3F51BA10A}">
+      <p15:sldGuideLst xmlns:p15="http://schemas.microsoft.com/office/powerpoint/2012/main"/>
+    </p:ext>
+  </p:extLst>
 </p:presentation>
 </file>
 
@@ -256,7 +261,7 @@
           <a:p>
             <a:fld id="{338539A1-D2F4-3842-9E76-26BC0324F01E}" type="datetimeFigureOut">
               <a:rPr lang="de-DE" smtClean="0"/>
-              <a:t>13.02.25</a:t>
+              <a:t>17.06.25</a:t>
             </a:fld>
             <a:endParaRPr lang="de-DE"/>
           </a:p>
@@ -456,7 +461,7 @@
           <a:p>
             <a:fld id="{338539A1-D2F4-3842-9E76-26BC0324F01E}" type="datetimeFigureOut">
               <a:rPr lang="de-DE" smtClean="0"/>
-              <a:t>13.02.25</a:t>
+              <a:t>17.06.25</a:t>
             </a:fld>
             <a:endParaRPr lang="de-DE"/>
           </a:p>
@@ -666,7 +671,7 @@
           <a:p>
             <a:fld id="{338539A1-D2F4-3842-9E76-26BC0324F01E}" type="datetimeFigureOut">
               <a:rPr lang="de-DE" smtClean="0"/>
-              <a:t>13.02.25</a:t>
+              <a:t>17.06.25</a:t>
             </a:fld>
             <a:endParaRPr lang="de-DE"/>
           </a:p>
@@ -866,7 +871,7 @@
           <a:p>
             <a:fld id="{338539A1-D2F4-3842-9E76-26BC0324F01E}" type="datetimeFigureOut">
               <a:rPr lang="de-DE" smtClean="0"/>
-              <a:t>13.02.25</a:t>
+              <a:t>17.06.25</a:t>
             </a:fld>
             <a:endParaRPr lang="de-DE"/>
           </a:p>
@@ -1142,7 +1147,7 @@
           <a:p>
             <a:fld id="{338539A1-D2F4-3842-9E76-26BC0324F01E}" type="datetimeFigureOut">
               <a:rPr lang="de-DE" smtClean="0"/>
-              <a:t>13.02.25</a:t>
+              <a:t>17.06.25</a:t>
             </a:fld>
             <a:endParaRPr lang="de-DE"/>
           </a:p>
@@ -1410,7 +1415,7 @@
           <a:p>
             <a:fld id="{338539A1-D2F4-3842-9E76-26BC0324F01E}" type="datetimeFigureOut">
               <a:rPr lang="de-DE" smtClean="0"/>
-              <a:t>13.02.25</a:t>
+              <a:t>17.06.25</a:t>
             </a:fld>
             <a:endParaRPr lang="de-DE"/>
           </a:p>
@@ -1825,7 +1830,7 @@
           <a:p>
             <a:fld id="{338539A1-D2F4-3842-9E76-26BC0324F01E}" type="datetimeFigureOut">
               <a:rPr lang="de-DE" smtClean="0"/>
-              <a:t>13.02.25</a:t>
+              <a:t>17.06.25</a:t>
             </a:fld>
             <a:endParaRPr lang="de-DE"/>
           </a:p>
@@ -1967,7 +1972,7 @@
           <a:p>
             <a:fld id="{338539A1-D2F4-3842-9E76-26BC0324F01E}" type="datetimeFigureOut">
               <a:rPr lang="de-DE" smtClean="0"/>
-              <a:t>13.02.25</a:t>
+              <a:t>17.06.25</a:t>
             </a:fld>
             <a:endParaRPr lang="de-DE"/>
           </a:p>
@@ -2080,7 +2085,7 @@
           <a:p>
             <a:fld id="{338539A1-D2F4-3842-9E76-26BC0324F01E}" type="datetimeFigureOut">
               <a:rPr lang="de-DE" smtClean="0"/>
-              <a:t>13.02.25</a:t>
+              <a:t>17.06.25</a:t>
             </a:fld>
             <a:endParaRPr lang="de-DE"/>
           </a:p>
@@ -2393,7 +2398,7 @@
           <a:p>
             <a:fld id="{338539A1-D2F4-3842-9E76-26BC0324F01E}" type="datetimeFigureOut">
               <a:rPr lang="de-DE" smtClean="0"/>
-              <a:t>13.02.25</a:t>
+              <a:t>17.06.25</a:t>
             </a:fld>
             <a:endParaRPr lang="de-DE"/>
           </a:p>
@@ -2682,7 +2687,7 @@
           <a:p>
             <a:fld id="{338539A1-D2F4-3842-9E76-26BC0324F01E}" type="datetimeFigureOut">
               <a:rPr lang="de-DE" smtClean="0"/>
-              <a:t>13.02.25</a:t>
+              <a:t>17.06.25</a:t>
             </a:fld>
             <a:endParaRPr lang="de-DE"/>
           </a:p>
@@ -2925,7 +2930,7 @@
           <a:p>
             <a:fld id="{338539A1-D2F4-3842-9E76-26BC0324F01E}" type="datetimeFigureOut">
               <a:rPr lang="de-DE" smtClean="0"/>
-              <a:t>13.02.25</a:t>
+              <a:t>17.06.25</a:t>
             </a:fld>
             <a:endParaRPr lang="de-DE"/>
           </a:p>
@@ -4023,7 +4028,7 @@
             <a:pPr algn="ctr"/>
             <a:r>
               <a:rPr lang="de-DE" dirty="0"/>
-              <a:t>100 km, 200km</a:t>
+              <a:t>200 km, 200km</a:t>
             </a:r>
           </a:p>
         </p:txBody>

</xml_diff>